<commit_message>
- update links in userguide
Former-commit-id: 61a227d68c47df585d5fa24b04b2b999465cc41c
</commit_message>
<xml_diff>
--- a/docs/Userguide.pptx
+++ b/docs/Userguide.pptx
@@ -7327,7 +7327,7 @@
           <p:nvPr>
             <p:extLst>
               <p:ext uri="{D42A27DB-BD31-4B8C-83A1-F6EECF244321}">
-                <p14:modId xmlns:p14="http://schemas.microsoft.com/office/powerpoint/2010/main" val="3322565873"/>
+                <p14:modId xmlns:p14="http://schemas.microsoft.com/office/powerpoint/2010/main" val="3933882105"/>
               </p:ext>
             </p:extLst>
           </p:nvPr>
@@ -7804,7 +7804,7 @@
                       </a:r>
                       <a:r>
                         <a:rPr lang="en-US" sz="1400" dirty="0"/>
-                        <a:t> * day</a:t>
+                        <a:t>.day</a:t>
                       </a:r>
                     </a:p>
                   </a:txBody>
@@ -7952,7 +7952,7 @@
                       </a:r>
                       <a:r>
                         <a:rPr lang="en-US" sz="1400" dirty="0"/>
-                        <a:t> * day</a:t>
+                        <a:t>.day</a:t>
                       </a:r>
                     </a:p>
                   </a:txBody>
@@ -8231,7 +8231,7 @@
           <p:nvPr>
             <p:extLst>
               <p:ext uri="{D42A27DB-BD31-4B8C-83A1-F6EECF244321}">
-                <p14:modId xmlns:p14="http://schemas.microsoft.com/office/powerpoint/2010/main" val="1362776297"/>
+                <p14:modId xmlns:p14="http://schemas.microsoft.com/office/powerpoint/2010/main" val="328044297"/>
               </p:ext>
             </p:extLst>
           </p:nvPr>
@@ -8640,7 +8640,7 @@
                       </a:r>
                       <a:r>
                         <a:rPr lang="en-US" sz="1400" dirty="0"/>
-                        <a:t> * day</a:t>
+                        <a:t>.day</a:t>
                       </a:r>
                     </a:p>
                   </a:txBody>
@@ -8874,7 +8874,7 @@
           <p:nvPr>
             <p:extLst>
               <p:ext uri="{D42A27DB-BD31-4B8C-83A1-F6EECF244321}">
-                <p14:modId xmlns:p14="http://schemas.microsoft.com/office/powerpoint/2010/main" val="2929593131"/>
+                <p14:modId xmlns:p14="http://schemas.microsoft.com/office/powerpoint/2010/main" val="2980759061"/>
               </p:ext>
             </p:extLst>
           </p:nvPr>
@@ -9283,7 +9283,7 @@
                       </a:r>
                       <a:r>
                         <a:rPr lang="en-US" sz="1400" dirty="0"/>
-                        <a:t> * day</a:t>
+                        <a:t>.day</a:t>
                       </a:r>
                     </a:p>
                   </a:txBody>
@@ -12444,7 +12444,7 @@
         <p:spPr>
           <a:xfrm>
             <a:off x="164387" y="123290"/>
-            <a:ext cx="11907748" cy="5509200"/>
+            <a:ext cx="11907748" cy="5324535"/>
           </a:xfrm>
           <a:prstGeom prst="rect">
             <a:avLst/>
@@ -12634,12 +12634,9 @@
               <a:rPr lang="en-US" sz="1200" dirty="0">
                 <a:hlinkClick r:id="rId5"/>
               </a:rPr>
-              <a:t>https://oceancolor.gsfc.nasa.gov/atbd/chlor_a</a:t>
-            </a:r>
-            <a:r>
-              <a:rPr lang="en-US" sz="1200" dirty="0"/>
-              <a:t> </a:t>
-            </a:r>
+              <a:t>https://oceancolor.gsfc.nasa.gov/resources/atbd/chlor_a</a:t>
+            </a:r>
+            <a:endParaRPr lang="en-US" sz="1200" dirty="0"/>
           </a:p>
           <a:p>
             <a:pPr marL="628650" lvl="1" indent="-171450">
@@ -12654,12 +12651,9 @@
               <a:rPr lang="en-US" sz="1200" dirty="0">
                 <a:hlinkClick r:id="rId6"/>
               </a:rPr>
-              <a:t>https://oceancolor.gsfc.nasa.gov/products</a:t>
-            </a:r>
-            <a:r>
-              <a:rPr lang="en-US" sz="1200" dirty="0"/>
-              <a:t> </a:t>
-            </a:r>
+              <a:t>https://oceancolor.gsfc.nasa.gov/l3</a:t>
+            </a:r>
+            <a:endParaRPr lang="en-US" sz="1200" dirty="0"/>
           </a:p>
           <a:p>
             <a:pPr marL="628650" lvl="1" indent="-171450">
@@ -12674,12 +12668,9 @@
               <a:rPr lang="en-US" sz="1200" dirty="0">
                 <a:hlinkClick r:id="rId7"/>
               </a:rPr>
-              <a:t>https://oceancolor.gsfc.nasa.gov/docs/format/l3bins</a:t>
-            </a:r>
-            <a:r>
-              <a:rPr lang="en-US" sz="1200" dirty="0"/>
-              <a:t> </a:t>
-            </a:r>
+              <a:t>https://oceancolor.gsfc.nasa.gov/resources/docs/format/l3bins</a:t>
+            </a:r>
+            <a:endParaRPr lang="en-US" sz="1200" dirty="0"/>
           </a:p>
           <a:p>
             <a:pPr marL="628650" lvl="1" indent="-171450">
@@ -12688,13 +12679,13 @@
             </a:pPr>
             <a:r>
               <a:rPr lang="en-US" sz="1200" dirty="0"/>
-              <a:t>Level-3 binned default flags: </a:t>
+              <a:t>Level-2 and 3 default flags: </a:t>
             </a:r>
             <a:r>
               <a:rPr lang="en-US" sz="1200" dirty="0">
                 <a:hlinkClick r:id="rId8"/>
               </a:rPr>
-              <a:t>https://oceancolor.gsfc.nasa.gov/atbd/ocl2flags</a:t>
+              <a:t>https://oceancolor.gsfc.nasa.gov/resources/atbd/ocl2flags</a:t>
             </a:r>
             <a:endParaRPr lang="en-US" sz="1200" dirty="0"/>
           </a:p>

</xml_diff>